<commit_message>
Inclusão de anotações para apresentação do ponto de extensão de um framework.
</commit_message>
<xml_diff>
--- a/CAP385-00-Presentations/02-JUnit 5/03-JUnit 5 - Arquitetura.pptx
+++ b/CAP385-00-Presentations/02-JUnit 5/03-JUnit 5 - Arquitetura.pptx
@@ -4955,34 +4955,118 @@
           <a:lstStyle/>
           <a:p>
             <a:r>
-              <a:rPr lang="pt-BR" dirty="0" smtClean="0"/>
-              <a:t>@Meta-</a:t>
-            </a:r>
-            <a:r>
-              <a:rPr lang="pt-BR" dirty="0" err="1" smtClean="0"/>
+              <a:rPr lang="pt-BR" sz="2800" dirty="0" smtClean="0"/>
+              <a:t>“</a:t>
+            </a:r>
+            <a:r>
+              <a:rPr lang="en-US" sz="2800" b="1" dirty="0"/>
+              <a:t>Prefer extension points over </a:t>
+            </a:r>
+            <a:r>
+              <a:rPr lang="en-US" sz="2800" b="1" dirty="0" smtClean="0"/>
+              <a:t>features” (</a:t>
+            </a:r>
+            <a:r>
+              <a:rPr lang="pt-BR" sz="2800" b="1" dirty="0"/>
+              <a:t>Kevin </a:t>
+            </a:r>
+            <a:r>
+              <a:rPr lang="pt-BR" sz="2800" b="1" dirty="0" err="1" smtClean="0"/>
+              <a:t>Cooney</a:t>
+            </a:r>
+            <a:r>
+              <a:rPr lang="pt-BR" sz="2800" b="1" dirty="0" smtClean="0"/>
+              <a:t>)</a:t>
+            </a:r>
+            <a:endParaRPr lang="pt-BR" sz="2800" dirty="0" smtClean="0"/>
+          </a:p>
+          <a:p>
+            <a:r>
+              <a:rPr lang="pt-BR" sz="2800" dirty="0" err="1" smtClean="0"/>
+              <a:t>JUnit</a:t>
+            </a:r>
+            <a:r>
+              <a:rPr lang="pt-BR" sz="2800" dirty="0" smtClean="0"/>
+              <a:t> 4: </a:t>
+            </a:r>
+            <a:r>
+              <a:rPr lang="pt-BR" sz="2800" i="1" dirty="0" err="1" smtClean="0"/>
+              <a:t>Runner</a:t>
+            </a:r>
+            <a:r>
+              <a:rPr lang="pt-BR" sz="2800" i="1" dirty="0" smtClean="0"/>
+              <a:t>, @</a:t>
+            </a:r>
+            <a:r>
+              <a:rPr lang="pt-BR" sz="2800" i="1" dirty="0" err="1" smtClean="0"/>
+              <a:t>Rule</a:t>
+            </a:r>
+            <a:r>
+              <a:rPr lang="pt-BR" sz="2800" i="1" dirty="0" smtClean="0"/>
+              <a:t>, @</a:t>
+            </a:r>
+            <a:r>
+              <a:rPr lang="pt-BR" sz="2800" i="1" dirty="0" err="1" smtClean="0"/>
+              <a:t>ClassRule</a:t>
+            </a:r>
+            <a:endParaRPr lang="pt-BR" sz="2800" i="1" dirty="0" smtClean="0"/>
+          </a:p>
+          <a:p>
+            <a:r>
+              <a:rPr lang="pt-BR" sz="2800" dirty="0"/>
+              <a:t>@</a:t>
+            </a:r>
+            <a:r>
+              <a:rPr lang="pt-BR" sz="2800" dirty="0" err="1"/>
+              <a:t>ExtendWith</a:t>
+            </a:r>
+            <a:r>
+              <a:rPr lang="pt-BR" sz="2800" dirty="0" smtClean="0"/>
+              <a:t>({Extension1.class</a:t>
+            </a:r>
+            <a:r>
+              <a:rPr lang="pt-BR" sz="2800" dirty="0"/>
+              <a:t>, </a:t>
+            </a:r>
+            <a:r>
+              <a:rPr lang="pt-BR" sz="2800" dirty="0" smtClean="0"/>
+              <a:t>Extension2.class </a:t>
+            </a:r>
+            <a:r>
+              <a:rPr lang="pt-BR" sz="2800" dirty="0"/>
+              <a:t>})</a:t>
+            </a:r>
+          </a:p>
+          <a:p>
+            <a:r>
+              <a:rPr lang="pt-BR" sz="2800" dirty="0" smtClean="0"/>
+              <a:t>Meta-</a:t>
+            </a:r>
+            <a:r>
+              <a:rPr lang="pt-BR" sz="2800" dirty="0" err="1" smtClean="0"/>
               <a:t>annotation</a:t>
             </a:r>
-            <a:endParaRPr lang="pt-BR" dirty="0" smtClean="0"/>
+            <a:endParaRPr lang="pt-BR" sz="2800" dirty="0" smtClean="0"/>
           </a:p>
           <a:p>
             <a:pPr lvl="1"/>
             <a:r>
-              <a:rPr lang="pt-BR" dirty="0" smtClean="0"/>
+              <a:rPr lang="pt-BR" sz="2400" dirty="0" smtClean="0"/>
               <a:t>@</a:t>
             </a:r>
             <a:r>
-              <a:rPr lang="pt-BR" dirty="0" err="1" smtClean="0"/>
+              <a:rPr lang="pt-BR" sz="2400" dirty="0" err="1" smtClean="0"/>
               <a:t>IntegrationTest</a:t>
             </a:r>
-            <a:endParaRPr lang="pt-BR" dirty="0" smtClean="0"/>
+            <a:endParaRPr lang="pt-BR" sz="2400" dirty="0" smtClean="0"/>
           </a:p>
           <a:p>
             <a:pPr lvl="1"/>
             <a:r>
-              <a:rPr lang="pt-BR" dirty="0" smtClean="0"/>
+              <a:rPr lang="pt-BR" sz="2400" dirty="0" smtClean="0"/>
               <a:t>@Benchmark</a:t>
             </a:r>
-            <a:endParaRPr lang="pt-BR" dirty="0"/>
+            <a:endParaRPr lang="pt-BR" sz="2400" dirty="0"/>
           </a:p>
           <a:p>
             <a:pPr marL="457200" lvl="1" indent="0">

</xml_diff>